<commit_message>
untangled bad repo, filenames on slides
</commit_message>
<xml_diff>
--- a/Slides/Module 09 React Hooks.pptx
+++ b/Slides/Module 09 React Hooks.pptx
@@ -6545,7 +6545,7 @@
           <a:p>
             <a:fld id="{07C7BFD4-467E-4EDE-93EA-052F5B39A4E5}" type="datetime1">
               <a:rPr lang="en-US" smtClean="0"/>
-              <a:t>2/3/2025</a:t>
+              <a:t>2/4/2025</a:t>
             </a:fld>
             <a:endParaRPr lang="en-US"/>
           </a:p>
@@ -8005,7 +8005,7 @@
           </a:ln>
           <a:extLst>
             <a:ext uri="{C572A759-6A51-4108-AA02-DFA0A04FC94B}">
-              <ma14:wrappingTextBoxFlag xmlns="" xmlns:m="http://schemas.openxmlformats.org/officeDocument/2006/math" xmlns:a14="http://schemas.microsoft.com/office/drawing/2010/main" xmlns:ma14="http://schemas.microsoft.com/office/mac/drawingml/2011/main" val="1"/>
+              <ma14:wrappingTextBoxFlag xmlns:ma14="http://schemas.microsoft.com/office/mac/drawingml/2011/main" xmlns:a14="http://schemas.microsoft.com/office/drawing/2010/main" xmlns:m="http://schemas.openxmlformats.org/officeDocument/2006/math" xmlns="" val="1"/>
             </a:ext>
           </a:extLst>
         </p:spPr>
@@ -8116,7 +8116,7 @@
           </a:ln>
           <a:extLst>
             <a:ext uri="{C572A759-6A51-4108-AA02-DFA0A04FC94B}">
-              <ma14:wrappingTextBoxFlag xmlns="" xmlns:m="http://schemas.openxmlformats.org/officeDocument/2006/math" xmlns:a14="http://schemas.microsoft.com/office/drawing/2010/main" xmlns:ma14="http://schemas.microsoft.com/office/mac/drawingml/2011/main" val="1"/>
+              <ma14:wrappingTextBoxFlag xmlns:ma14="http://schemas.microsoft.com/office/mac/drawingml/2011/main" xmlns:a14="http://schemas.microsoft.com/office/drawing/2010/main" xmlns:m="http://schemas.openxmlformats.org/officeDocument/2006/math" xmlns="" val="1"/>
             </a:ext>
           </a:extLst>
         </p:spPr>
@@ -9015,7 +9015,7 @@
           </a:prstGeom>
           <a:extLst>
             <a:ext uri="{C572A759-6A51-4108-AA02-DFA0A04FC94B}">
-              <ma14:wrappingTextBoxFlag xmlns="" xmlns:m="http://schemas.openxmlformats.org/officeDocument/2006/math" xmlns:a14="http://schemas.microsoft.com/office/drawing/2010/main" xmlns:ma14="http://schemas.microsoft.com/office/mac/drawingml/2011/main" val="1"/>
+              <ma14:wrappingTextBoxFlag xmlns:ma14="http://schemas.microsoft.com/office/mac/drawingml/2011/main" xmlns:a14="http://schemas.microsoft.com/office/drawing/2010/main" xmlns:m="http://schemas.openxmlformats.org/officeDocument/2006/math" xmlns="" val="1"/>
             </a:ext>
           </a:extLst>
         </p:spPr>
@@ -9050,7 +9050,7 @@
           </a:ln>
           <a:extLst>
             <a:ext uri="{C572A759-6A51-4108-AA02-DFA0A04FC94B}">
-              <ma14:wrappingTextBoxFlag xmlns="" xmlns:m="http://schemas.openxmlformats.org/officeDocument/2006/math" xmlns:a14="http://schemas.microsoft.com/office/drawing/2010/main" xmlns:ma14="http://schemas.microsoft.com/office/mac/drawingml/2011/main" val="1"/>
+              <ma14:wrappingTextBoxFlag xmlns:ma14="http://schemas.microsoft.com/office/mac/drawingml/2011/main" xmlns:a14="http://schemas.microsoft.com/office/drawing/2010/main" xmlns:m="http://schemas.openxmlformats.org/officeDocument/2006/math" xmlns="" val="1"/>
             </a:ext>
           </a:extLst>
         </p:spPr>
@@ -9240,7 +9240,7 @@
                   <a:schemeClr val="tx1"/>
                 </a:solidFill>
               </a:rPr>
-              <a:t>/app/Components/</a:t>
+              <a:t>/Components/</a:t>
             </a:r>
             <a:r>
               <a:rPr lang="en-US" sz="2400" dirty="0" err="1">
@@ -12764,7 +12764,7 @@
         <p:spPr>
           <a:xfrm>
             <a:off x="838200" y="1410779"/>
-            <a:ext cx="8310112" cy="5262979"/>
+            <a:ext cx="8310112" cy="5370701"/>
           </a:xfrm>
           <a:prstGeom prst="rect">
             <a:avLst/>
@@ -13639,35 +13639,6 @@
             </a:r>
           </a:p>
           <a:p>
-            <a:br>
-              <a:rPr lang="en-US" sz="1400" b="0" dirty="0">
-                <a:solidFill>
-                  <a:srgbClr val="000000"/>
-                </a:solidFill>
-                <a:effectLst/>
-                <a:latin typeface="Consolas" panose="020B0609020204030204" pitchFamily="49" charset="0"/>
-              </a:rPr>
-            </a:br>
-            <a:r>
-              <a:rPr lang="en-US" sz="1400" b="0" dirty="0">
-                <a:solidFill>
-                  <a:srgbClr val="000000"/>
-                </a:solidFill>
-                <a:effectLst/>
-                <a:latin typeface="Consolas" panose="020B0609020204030204" pitchFamily="49" charset="0"/>
-              </a:rPr>
-              <a:t>    </a:t>
-            </a:r>
-            <a:r>
-              <a:rPr lang="en-US" sz="1400" b="0" dirty="0">
-                <a:solidFill>
-                  <a:srgbClr val="008000"/>
-                </a:solidFill>
-                <a:effectLst/>
-                <a:latin typeface="Consolas" panose="020B0609020204030204" pitchFamily="49" charset="0"/>
-              </a:rPr>
-              <a:t>// runs on every render</a:t>
-            </a:r>
             <a:endParaRPr lang="en-US" sz="1400" b="0" dirty="0">
               <a:solidFill>
                 <a:srgbClr val="000000"/>
@@ -13677,20 +13648,25 @@
             </a:endParaRPr>
           </a:p>
           <a:p>
-            <a:r>
-              <a:rPr lang="en-US" sz="1400" b="0" dirty="0">
-                <a:solidFill>
-                  <a:srgbClr val="000000"/>
-                </a:solidFill>
-                <a:effectLst/>
-                <a:latin typeface="Consolas" panose="020B0609020204030204" pitchFamily="49" charset="0"/>
-              </a:rPr>
-              <a:t>    </a:t>
+            <a:pPr>
+              <a:lnSpc>
+                <a:spcPts val="1425"/>
+              </a:lnSpc>
+            </a:pPr>
+            <a:r>
+              <a:rPr lang="en-US" sz="1400" b="0" dirty="0">
+                <a:solidFill>
+                  <a:srgbClr val="000000"/>
+                </a:solidFill>
+                <a:effectLst/>
+                <a:latin typeface="Consolas" panose="020B0609020204030204" pitchFamily="49" charset="0"/>
+              </a:rPr>
+              <a:t>    </a:t>
             </a:r>
             <a:r>
               <a:rPr lang="en-US" sz="1400" b="0" dirty="0" err="1">
                 <a:solidFill>
-                  <a:srgbClr val="795E26"/>
+                  <a:srgbClr val="000000"/>
                 </a:solidFill>
                 <a:effectLst/>
                 <a:latin typeface="Consolas" panose="020B0609020204030204" pitchFamily="49" charset="0"/>
@@ -13729,55 +13705,20 @@
             </a:r>
           </a:p>
           <a:p>
-            <a:r>
-              <a:rPr lang="en-US" sz="1400" b="0" dirty="0">
-                <a:solidFill>
-                  <a:srgbClr val="000000"/>
-                </a:solidFill>
-                <a:effectLst/>
-                <a:latin typeface="Consolas" panose="020B0609020204030204" pitchFamily="49" charset="0"/>
-              </a:rPr>
-              <a:t>        </a:t>
-            </a:r>
-            <a:r>
-              <a:rPr lang="en-US" sz="1400" b="0" dirty="0">
-                <a:solidFill>
-                  <a:srgbClr val="001080"/>
-                </a:solidFill>
-                <a:effectLst/>
-                <a:latin typeface="Consolas" panose="020B0609020204030204" pitchFamily="49" charset="0"/>
-              </a:rPr>
-              <a:t>console</a:t>
-            </a:r>
-            <a:r>
-              <a:rPr lang="en-US" sz="1400" b="0" dirty="0">
-                <a:solidFill>
-                  <a:srgbClr val="000000"/>
-                </a:solidFill>
-                <a:effectLst/>
-                <a:latin typeface="Consolas" panose="020B0609020204030204" pitchFamily="49" charset="0"/>
-              </a:rPr>
-              <a:t>.</a:t>
-            </a:r>
-            <a:r>
-              <a:rPr lang="en-US" sz="1400" b="0" dirty="0">
-                <a:solidFill>
-                  <a:srgbClr val="795E26"/>
-                </a:solidFill>
-                <a:effectLst/>
-                <a:latin typeface="Consolas" panose="020B0609020204030204" pitchFamily="49" charset="0"/>
-              </a:rPr>
-              <a:t>log</a:t>
-            </a:r>
-            <a:r>
-              <a:rPr lang="en-US" sz="1400" b="0" dirty="0">
-                <a:solidFill>
-                  <a:srgbClr val="000000"/>
-                </a:solidFill>
-                <a:effectLst/>
-                <a:latin typeface="Consolas" panose="020B0609020204030204" pitchFamily="49" charset="0"/>
-              </a:rPr>
-              <a:t>(</a:t>
+            <a:pPr>
+              <a:lnSpc>
+                <a:spcPts val="1425"/>
+              </a:lnSpc>
+            </a:pPr>
+            <a:r>
+              <a:rPr lang="en-US" sz="1400" b="0" dirty="0">
+                <a:solidFill>
+                  <a:srgbClr val="000000"/>
+                </a:solidFill>
+                <a:effectLst/>
+                <a:latin typeface="Consolas" panose="020B0609020204030204" pitchFamily="49" charset="0"/>
+              </a:rPr>
+              <a:t>        console.log(</a:t>
             </a:r>
             <a:r>
               <a:rPr lang="en-US" sz="1400" b="0" dirty="0">
@@ -13807,17 +13748,54 @@
                 <a:effectLst/>
                 <a:latin typeface="Consolas" panose="020B0609020204030204" pitchFamily="49" charset="0"/>
               </a:rPr>
-              <a:t> #3A is called on every render'</a:t>
-            </a:r>
-            <a:r>
-              <a:rPr lang="en-US" sz="1400" b="0" dirty="0">
-                <a:solidFill>
-                  <a:srgbClr val="000000"/>
-                </a:solidFill>
-                <a:effectLst/>
-                <a:latin typeface="Consolas" panose="020B0609020204030204" pitchFamily="49" charset="0"/>
-              </a:rPr>
-              <a:t>)})</a:t>
+              <a:t> #2MN is run when m or n changes'</a:t>
+            </a:r>
+            <a:r>
+              <a:rPr lang="en-US" sz="1400" b="0" dirty="0">
+                <a:solidFill>
+                  <a:srgbClr val="000000"/>
+                </a:solidFill>
+                <a:effectLst/>
+                <a:latin typeface="Consolas" panose="020B0609020204030204" pitchFamily="49" charset="0"/>
+              </a:rPr>
+              <a:t>)</a:t>
+            </a:r>
+          </a:p>
+          <a:p>
+            <a:pPr>
+              <a:lnSpc>
+                <a:spcPts val="1425"/>
+              </a:lnSpc>
+            </a:pPr>
+            <a:r>
+              <a:rPr lang="en-US" sz="1400" b="0" dirty="0">
+                <a:solidFill>
+                  <a:srgbClr val="000000"/>
+                </a:solidFill>
+                <a:effectLst/>
+                <a:latin typeface="Consolas" panose="020B0609020204030204" pitchFamily="49" charset="0"/>
+              </a:rPr>
+              <a:t>    }, [</a:t>
+            </a:r>
+            <a:r>
+              <a:rPr lang="en-US" sz="1400" b="0" dirty="0" err="1">
+                <a:solidFill>
+                  <a:srgbClr val="000000"/>
+                </a:solidFill>
+                <a:effectLst/>
+                <a:latin typeface="Consolas" panose="020B0609020204030204" pitchFamily="49" charset="0"/>
+              </a:rPr>
+              <a:t>m,n</a:t>
+            </a:r>
+            <a:r>
+              <a:rPr lang="en-US" sz="1400" b="0" dirty="0">
+                <a:solidFill>
+                  <a:srgbClr val="000000"/>
+                </a:solidFill>
+                <a:effectLst/>
+                <a:latin typeface="Consolas" panose="020B0609020204030204" pitchFamily="49" charset="0"/>
+              </a:rPr>
+              <a:t>]</a:t>
             </a:r>
           </a:p>
           <a:p>
@@ -13989,7 +13967,7 @@
                 <a:effectLst/>
                 <a:latin typeface="Consolas" panose="020B0609020204030204" pitchFamily="49" charset="0"/>
               </a:rPr>
-              <a:t> #3B is called on every render'</a:t>
+              <a:t> #3 is called on every render'</a:t>
             </a:r>
             <a:r>
               <a:rPr lang="en-US" sz="1400" b="0" dirty="0">
@@ -14016,8 +13994,10 @@
                 <a:effectLst/>
                 <a:latin typeface="Consolas" panose="020B0609020204030204" pitchFamily="49" charset="0"/>
               </a:rPr>
-              <a:t>// observe that effects run in order of definition</a:t>
-            </a:r>
+              <a:t>    // observe that effects run in order of definition</a:t>
+            </a:r>
+          </a:p>
+          <a:p>
             <a:endParaRPr lang="en-US" sz="1400" b="0" dirty="0">
               <a:solidFill>
                 <a:srgbClr val="000000"/>
@@ -14107,7 +14087,7 @@
                   <a:schemeClr val="tx1"/>
                 </a:solidFill>
               </a:rPr>
-              <a:t>/Apps/</a:t>
+              <a:t>/app/Apps/</a:t>
             </a:r>
             <a:r>
               <a:rPr lang="en-US" sz="2400" dirty="0" err="1">
@@ -16833,6 +16813,9 @@
                   <a:srgbClr val="795E26"/>
                 </a:solidFill>
                 <a:effectLst/>
+                <a:highlight>
+                  <a:srgbClr val="FFFF00"/>
+                </a:highlight>
                 <a:latin typeface="Consolas" panose="020B0609020204030204" pitchFamily="49" charset="0"/>
               </a:rPr>
               <a:t>cleanup</a:t>
@@ -16843,6 +16826,9 @@
                   <a:srgbClr val="3B3B3B"/>
                 </a:solidFill>
                 <a:effectLst/>
+                <a:highlight>
+                  <a:srgbClr val="FFFF00"/>
+                </a:highlight>
                 <a:latin typeface="Consolas" panose="020B0609020204030204" pitchFamily="49" charset="0"/>
               </a:rPr>
               <a:t>(</a:t>
@@ -16853,6 +16839,9 @@
                   <a:srgbClr val="A31515"/>
                 </a:solidFill>
                 <a:effectLst/>
+                <a:highlight>
+                  <a:srgbClr val="FFFF00"/>
+                </a:highlight>
                 <a:latin typeface="Consolas" panose="020B0609020204030204" pitchFamily="49" charset="0"/>
               </a:rPr>
               <a:t>'</a:t>
@@ -16863,6 +16852,9 @@
                   <a:srgbClr val="A31515"/>
                 </a:solidFill>
                 <a:effectLst/>
+                <a:highlight>
+                  <a:srgbClr val="FFFF00"/>
+                </a:highlight>
                 <a:latin typeface="Consolas" panose="020B0609020204030204" pitchFamily="49" charset="0"/>
               </a:rPr>
               <a:t>useEffect</a:t>
@@ -16873,6 +16865,9 @@
                   <a:srgbClr val="A31515"/>
                 </a:solidFill>
                 <a:effectLst/>
+                <a:highlight>
+                  <a:srgbClr val="FFFF00"/>
+                </a:highlight>
                 <a:latin typeface="Consolas" panose="020B0609020204030204" pitchFamily="49" charset="0"/>
               </a:rPr>
               <a:t> #1'</a:t>
@@ -16883,6 +16878,9 @@
                   <a:srgbClr val="3B3B3B"/>
                 </a:solidFill>
                 <a:effectLst/>
+                <a:highlight>
+                  <a:srgbClr val="FFFF00"/>
+                </a:highlight>
                 <a:latin typeface="Consolas" panose="020B0609020204030204" pitchFamily="49" charset="0"/>
               </a:rPr>
               <a:t>)</a:t>
@@ -17090,6 +17088,9 @@
                   <a:srgbClr val="795E26"/>
                 </a:solidFill>
                 <a:effectLst/>
+                <a:highlight>
+                  <a:srgbClr val="FFFF00"/>
+                </a:highlight>
                 <a:latin typeface="Consolas" panose="020B0609020204030204" pitchFamily="49" charset="0"/>
               </a:rPr>
               <a:t>cleanup</a:t>
@@ -17100,6 +17101,9 @@
                   <a:srgbClr val="3B3B3B"/>
                 </a:solidFill>
                 <a:effectLst/>
+                <a:highlight>
+                  <a:srgbClr val="FFFF00"/>
+                </a:highlight>
                 <a:latin typeface="Consolas" panose="020B0609020204030204" pitchFamily="49" charset="0"/>
               </a:rPr>
               <a:t>(</a:t>
@@ -17110,6 +17114,9 @@
                   <a:srgbClr val="A31515"/>
                 </a:solidFill>
                 <a:effectLst/>
+                <a:highlight>
+                  <a:srgbClr val="FFFF00"/>
+                </a:highlight>
                 <a:latin typeface="Consolas" panose="020B0609020204030204" pitchFamily="49" charset="0"/>
               </a:rPr>
               <a:t>'</a:t>
@@ -17120,6 +17127,9 @@
                   <a:srgbClr val="A31515"/>
                 </a:solidFill>
                 <a:effectLst/>
+                <a:highlight>
+                  <a:srgbClr val="FFFF00"/>
+                </a:highlight>
                 <a:latin typeface="Consolas" panose="020B0609020204030204" pitchFamily="49" charset="0"/>
               </a:rPr>
               <a:t>useEffect</a:t>
@@ -17130,6 +17140,9 @@
                   <a:srgbClr val="A31515"/>
                 </a:solidFill>
                 <a:effectLst/>
+                <a:highlight>
+                  <a:srgbClr val="FFFF00"/>
+                </a:highlight>
                 <a:latin typeface="Consolas" panose="020B0609020204030204" pitchFamily="49" charset="0"/>
               </a:rPr>
               <a:t> #2N'</a:t>
@@ -17140,6 +17153,9 @@
                   <a:srgbClr val="3B3B3B"/>
                 </a:solidFill>
                 <a:effectLst/>
+                <a:highlight>
+                  <a:srgbClr val="FFFF00"/>
+                </a:highlight>
                 <a:latin typeface="Consolas" panose="020B0609020204030204" pitchFamily="49" charset="0"/>
               </a:rPr>
               <a:t>)</a:t>
@@ -20330,8 +20346,8 @@
         </p:nvSpPr>
         <p:spPr>
           <a:xfrm>
-            <a:off x="4421171" y="157400"/>
-            <a:ext cx="7365258" cy="601981"/>
+            <a:off x="3922776" y="157400"/>
+            <a:ext cx="7863653" cy="601981"/>
           </a:xfrm>
           <a:prstGeom prst="roundRect">
             <a:avLst/>
@@ -22366,7 +22382,7 @@
                   <a:schemeClr val="tx1"/>
                 </a:solidFill>
               </a:rPr>
-              <a:t>ToDoAppOld</a:t>
+              <a:t>ToDoApp</a:t>
             </a:r>
             <a:r>
               <a:rPr lang="en-US" sz="2400" dirty="0">
@@ -24659,8 +24675,8 @@
         </p:nvSpPr>
         <p:spPr>
           <a:xfrm>
-            <a:off x="4409440" y="105538"/>
-            <a:ext cx="7589519" cy="601981"/>
+            <a:off x="3182112" y="105538"/>
+            <a:ext cx="8816847" cy="601981"/>
           </a:xfrm>
           <a:prstGeom prst="roundRect">
             <a:avLst/>
@@ -27559,7 +27575,7 @@
           </a:prstGeom>
           <a:extLst>
             <a:ext uri="{C572A759-6A51-4108-AA02-DFA0A04FC94B}">
-              <ma14:wrappingTextBoxFlag xmlns="" xmlns:m="http://schemas.openxmlformats.org/officeDocument/2006/math" xmlns:a14="http://schemas.microsoft.com/office/drawing/2010/main" xmlns:ma14="http://schemas.microsoft.com/office/mac/drawingml/2011/main" val="1"/>
+              <ma14:wrappingTextBoxFlag xmlns:ma14="http://schemas.microsoft.com/office/mac/drawingml/2011/main" xmlns:a14="http://schemas.microsoft.com/office/drawing/2010/main" xmlns:m="http://schemas.openxmlformats.org/officeDocument/2006/math" xmlns="" val="1"/>
             </a:ext>
           </a:extLst>
         </p:spPr>
@@ -27600,7 +27616,7 @@
           </a:ln>
           <a:extLst>
             <a:ext uri="{C572A759-6A51-4108-AA02-DFA0A04FC94B}">
-              <ma14:wrappingTextBoxFlag xmlns="" xmlns:m="http://schemas.openxmlformats.org/officeDocument/2006/math" xmlns:a14="http://schemas.microsoft.com/office/drawing/2010/main" xmlns:ma14="http://schemas.microsoft.com/office/mac/drawingml/2011/main" val="1"/>
+              <ma14:wrappingTextBoxFlag xmlns:ma14="http://schemas.microsoft.com/office/mac/drawingml/2011/main" xmlns:a14="http://schemas.microsoft.com/office/drawing/2010/main" xmlns:m="http://schemas.openxmlformats.org/officeDocument/2006/math" xmlns="" val="1"/>
             </a:ext>
           </a:extLst>
         </p:spPr>
@@ -27875,7 +27891,7 @@
             <a:effectLst/>
             <a:extLst>
               <a:ext uri="{C572A759-6A51-4108-AA02-DFA0A04FC94B}">
-                <ma14:wrappingTextBoxFlag xmlns="" xmlns:m="http://schemas.openxmlformats.org/officeDocument/2006/math" xmlns:a14="http://schemas.microsoft.com/office/drawing/2010/main" xmlns:ma14="http://schemas.microsoft.com/office/mac/drawingml/2011/main" val="1"/>
+                <ma14:wrappingTextBoxFlag xmlns:ma14="http://schemas.microsoft.com/office/mac/drawingml/2011/main" xmlns:a14="http://schemas.microsoft.com/office/drawing/2010/main" xmlns:m="http://schemas.openxmlformats.org/officeDocument/2006/math" xmlns="" val="1"/>
               </a:ext>
             </a:extLst>
           </p:spPr>
@@ -28219,7 +28235,7 @@
           </a:prstGeom>
           <a:extLst>
             <a:ext uri="{C572A759-6A51-4108-AA02-DFA0A04FC94B}">
-              <ma14:wrappingTextBoxFlag xmlns="" xmlns:m="http://schemas.openxmlformats.org/officeDocument/2006/math" xmlns:a14="http://schemas.microsoft.com/office/drawing/2010/main" xmlns:ma14="http://schemas.microsoft.com/office/mac/drawingml/2011/main" val="1"/>
+              <ma14:wrappingTextBoxFlag xmlns:ma14="http://schemas.microsoft.com/office/mac/drawingml/2011/main" xmlns:a14="http://schemas.microsoft.com/office/drawing/2010/main" xmlns:m="http://schemas.openxmlformats.org/officeDocument/2006/math" xmlns="" val="1"/>
             </a:ext>
           </a:extLst>
         </p:spPr>
@@ -28490,7 +28506,7 @@
           </a:prstGeom>
           <a:extLst>
             <a:ext uri="{C572A759-6A51-4108-AA02-DFA0A04FC94B}">
-              <ma14:wrappingTextBoxFlag xmlns:ma14="http://schemas.microsoft.com/office/mac/drawingml/2011/main" xmlns:a14="http://schemas.microsoft.com/office/drawing/2010/main" xmlns:m="http://schemas.openxmlformats.org/officeDocument/2006/math" xmlns="" val="1"/>
+              <ma14:wrappingTextBoxFlag xmlns="" xmlns:m="http://schemas.openxmlformats.org/officeDocument/2006/math" xmlns:a14="http://schemas.microsoft.com/office/drawing/2010/main" xmlns:ma14="http://schemas.microsoft.com/office/mac/drawingml/2011/main" val="1"/>
             </a:ext>
           </a:extLst>
         </p:spPr>
@@ -28534,7 +28550,7 @@
           </a:ln>
           <a:extLst>
             <a:ext uri="{C572A759-6A51-4108-AA02-DFA0A04FC94B}">
-              <ma14:wrappingTextBoxFlag xmlns:ma14="http://schemas.microsoft.com/office/mac/drawingml/2011/main" xmlns:a14="http://schemas.microsoft.com/office/drawing/2010/main" xmlns:m="http://schemas.openxmlformats.org/officeDocument/2006/math" xmlns="" val="1"/>
+              <ma14:wrappingTextBoxFlag xmlns="" xmlns:m="http://schemas.openxmlformats.org/officeDocument/2006/math" xmlns:a14="http://schemas.microsoft.com/office/drawing/2010/main" xmlns:ma14="http://schemas.microsoft.com/office/mac/drawingml/2011/main" val="1"/>
             </a:ext>
           </a:extLst>
         </p:spPr>
@@ -35793,8 +35809,8 @@
         </p:nvSpPr>
         <p:spPr>
           <a:xfrm>
-            <a:off x="6862865" y="910299"/>
-            <a:ext cx="5176128" cy="601981"/>
+            <a:off x="5431536" y="910299"/>
+            <a:ext cx="6607457" cy="601981"/>
           </a:xfrm>
           <a:prstGeom prst="roundRect">
             <a:avLst/>
@@ -35846,7 +35862,7 @@
                   <a:schemeClr val="tx1"/>
                 </a:solidFill>
               </a:rPr>
-              <a:t>/Components/</a:t>
+              <a:t>/app/Components/</a:t>
             </a:r>
             <a:r>
               <a:rPr lang="en-US" sz="2400" dirty="0" err="1">
@@ -35854,7 +35870,7 @@
                   <a:schemeClr val="tx1"/>
                 </a:solidFill>
               </a:rPr>
-              <a:t>ClockDisplay.tsx</a:t>
+              <a:t>SimpleClockDisplay.tsx</a:t>
             </a:r>
             <a:endParaRPr lang="en-US" sz="2400" dirty="0">
               <a:solidFill>
@@ -39461,8 +39477,8 @@
         </p:nvSpPr>
         <p:spPr>
           <a:xfrm>
-            <a:off x="7015872" y="76651"/>
-            <a:ext cx="5176128" cy="601981"/>
+            <a:off x="6551629" y="76651"/>
+            <a:ext cx="5640371" cy="601981"/>
           </a:xfrm>
           <a:prstGeom prst="roundRect">
             <a:avLst/>
@@ -39576,7 +39592,7 @@
         <p:spPr>
           <a:xfrm>
             <a:off x="6798732" y="1615529"/>
-            <a:ext cx="9110133" cy="4401205"/>
+            <a:ext cx="9110133" cy="4580741"/>
           </a:xfrm>
           <a:prstGeom prst="rect">
             <a:avLst/>
@@ -39645,6 +39661,83 @@
                 <a:latin typeface="Consolas" panose="020B0609020204030204" pitchFamily="49" charset="0"/>
               </a:rPr>
               <a:t> start() {</a:t>
+            </a:r>
+          </a:p>
+          <a:p>
+            <a:pPr>
+              <a:lnSpc>
+                <a:spcPts val="1425"/>
+              </a:lnSpc>
+            </a:pPr>
+            <a:r>
+              <a:rPr lang="en-US" sz="1400" b="0" dirty="0">
+                <a:solidFill>
+                  <a:srgbClr val="000000"/>
+                </a:solidFill>
+                <a:effectLst/>
+                <a:latin typeface="Consolas" panose="020B0609020204030204" pitchFamily="49" charset="0"/>
+              </a:rPr>
+              <a:t>        console.log(</a:t>
+            </a:r>
+            <a:r>
+              <a:rPr lang="en-US" sz="1400" b="0" dirty="0">
+                <a:solidFill>
+                  <a:srgbClr val="A31515"/>
+                </a:solidFill>
+                <a:effectLst/>
+                <a:latin typeface="Consolas" panose="020B0609020204030204" pitchFamily="49" charset="0"/>
+              </a:rPr>
+              <a:t>`Clock </a:t>
+            </a:r>
+            <a:r>
+              <a:rPr lang="en-US" sz="1400" b="0" dirty="0">
+                <a:solidFill>
+                  <a:srgbClr val="0000FF"/>
+                </a:solidFill>
+                <a:effectLst/>
+                <a:latin typeface="Consolas" panose="020B0609020204030204" pitchFamily="49" charset="0"/>
+              </a:rPr>
+              <a:t>${this</a:t>
+            </a:r>
+            <a:r>
+              <a:rPr lang="en-US" sz="1400" b="0" dirty="0">
+                <a:solidFill>
+                  <a:srgbClr val="000000"/>
+                </a:solidFill>
+                <a:effectLst/>
+                <a:latin typeface="Consolas" panose="020B0609020204030204" pitchFamily="49" charset="0"/>
+              </a:rPr>
+              <a:t>.id</a:t>
+            </a:r>
+            <a:r>
+              <a:rPr lang="en-US" sz="1400" b="0" dirty="0">
+                <a:solidFill>
+                  <a:srgbClr val="0000FF"/>
+                </a:solidFill>
+                <a:effectLst/>
+                <a:latin typeface="Consolas" panose="020B0609020204030204" pitchFamily="49" charset="0"/>
+              </a:rPr>
+              <a:t>}</a:t>
+            </a:r>
+            <a:r>
+              <a:rPr lang="en-US" sz="1400" b="0" dirty="0">
+                <a:solidFill>
+                  <a:srgbClr val="A31515"/>
+                </a:solidFill>
+                <a:effectLst/>
+                <a:latin typeface="Consolas" panose="020B0609020204030204" pitchFamily="49" charset="0"/>
+              </a:rPr>
+              <a:t> starting`</a:t>
+            </a:r>
+            <a:r>
+              <a:rPr lang="en-US" sz="1400" b="0" dirty="0">
+                <a:solidFill>
+                  <a:srgbClr val="000000"/>
+                </a:solidFill>
+                <a:effectLst/>
+                <a:latin typeface="Consolas" panose="020B0609020204030204" pitchFamily="49" charset="0"/>
+              </a:rPr>
+              <a:t>)</a:t>
             </a:r>
           </a:p>
           <a:p>
@@ -41153,8 +41246,8 @@
         </p:nvSpPr>
         <p:spPr>
           <a:xfrm>
-            <a:off x="6892304" y="838067"/>
-            <a:ext cx="5176128" cy="601981"/>
+            <a:off x="6007608" y="838067"/>
+            <a:ext cx="6060824" cy="601981"/>
           </a:xfrm>
           <a:prstGeom prst="roundRect">
             <a:avLst/>

</xml_diff>

<commit_message>
updates Slide 16,19 graphics
</commit_message>
<xml_diff>
--- a/Slides/Module 09 React Hooks.pptx
+++ b/Slides/Module 09 React Hooks.pptx
@@ -6545,7 +6545,7 @@
           <a:p>
             <a:fld id="{07C7BFD4-467E-4EDE-93EA-052F5B39A4E5}" type="datetime1">
               <a:rPr lang="en-US" smtClean="0"/>
-              <a:t>2/4/2025</a:t>
+              <a:t>2/5/2025</a:t>
             </a:fld>
             <a:endParaRPr lang="en-US"/>
           </a:p>
@@ -8005,7 +8005,7 @@
           </a:ln>
           <a:extLst>
             <a:ext uri="{C572A759-6A51-4108-AA02-DFA0A04FC94B}">
-              <ma14:wrappingTextBoxFlag xmlns:ma14="http://schemas.microsoft.com/office/mac/drawingml/2011/main" xmlns:a14="http://schemas.microsoft.com/office/drawing/2010/main" xmlns:m="http://schemas.openxmlformats.org/officeDocument/2006/math" xmlns="" val="1"/>
+              <ma14:wrappingTextBoxFlag xmlns="" xmlns:m="http://schemas.openxmlformats.org/officeDocument/2006/math" xmlns:a14="http://schemas.microsoft.com/office/drawing/2010/main" xmlns:ma14="http://schemas.microsoft.com/office/mac/drawingml/2011/main" val="1"/>
             </a:ext>
           </a:extLst>
         </p:spPr>
@@ -8116,7 +8116,7 @@
           </a:ln>
           <a:extLst>
             <a:ext uri="{C572A759-6A51-4108-AA02-DFA0A04FC94B}">
-              <ma14:wrappingTextBoxFlag xmlns:ma14="http://schemas.microsoft.com/office/mac/drawingml/2011/main" xmlns:a14="http://schemas.microsoft.com/office/drawing/2010/main" xmlns:m="http://schemas.openxmlformats.org/officeDocument/2006/math" xmlns="" val="1"/>
+              <ma14:wrappingTextBoxFlag xmlns="" xmlns:m="http://schemas.openxmlformats.org/officeDocument/2006/math" xmlns:a14="http://schemas.microsoft.com/office/drawing/2010/main" xmlns:ma14="http://schemas.microsoft.com/office/mac/drawingml/2011/main" val="1"/>
             </a:ext>
           </a:extLst>
         </p:spPr>
@@ -9015,7 +9015,7 @@
           </a:prstGeom>
           <a:extLst>
             <a:ext uri="{C572A759-6A51-4108-AA02-DFA0A04FC94B}">
-              <ma14:wrappingTextBoxFlag xmlns:ma14="http://schemas.microsoft.com/office/mac/drawingml/2011/main" xmlns:a14="http://schemas.microsoft.com/office/drawing/2010/main" xmlns:m="http://schemas.openxmlformats.org/officeDocument/2006/math" xmlns="" val="1"/>
+              <ma14:wrappingTextBoxFlag xmlns="" xmlns:m="http://schemas.openxmlformats.org/officeDocument/2006/math" xmlns:a14="http://schemas.microsoft.com/office/drawing/2010/main" xmlns:ma14="http://schemas.microsoft.com/office/mac/drawingml/2011/main" val="1"/>
             </a:ext>
           </a:extLst>
         </p:spPr>
@@ -9050,7 +9050,7 @@
           </a:ln>
           <a:extLst>
             <a:ext uri="{C572A759-6A51-4108-AA02-DFA0A04FC94B}">
-              <ma14:wrappingTextBoxFlag xmlns:ma14="http://schemas.microsoft.com/office/mac/drawingml/2011/main" xmlns:a14="http://schemas.microsoft.com/office/drawing/2010/main" xmlns:m="http://schemas.openxmlformats.org/officeDocument/2006/math" xmlns="" val="1"/>
+              <ma14:wrappingTextBoxFlag xmlns="" xmlns:m="http://schemas.openxmlformats.org/officeDocument/2006/math" xmlns:a14="http://schemas.microsoft.com/office/drawing/2010/main" xmlns:ma14="http://schemas.microsoft.com/office/mac/drawingml/2011/main" val="1"/>
             </a:ext>
           </a:extLst>
         </p:spPr>
@@ -15737,10 +15737,10 @@
       </p:sp>
       <p:pic>
         <p:nvPicPr>
-          <p:cNvPr id="5" name="Picture 4">
+          <p:cNvPr id="8" name="Picture 7">
             <a:extLst>
               <a:ext uri="{FF2B5EF4-FFF2-40B4-BE49-F238E27FC236}">
-                <a16:creationId xmlns:a16="http://schemas.microsoft.com/office/drawing/2014/main" id="{2C4F288C-ADBE-D863-24A3-6B2814863D39}"/>
+                <a16:creationId xmlns:a16="http://schemas.microsoft.com/office/drawing/2014/main" id="{437F3233-5FE3-35B8-D6D9-A620044C20C9}"/>
               </a:ext>
             </a:extLst>
           </p:cNvPr>
@@ -15757,8 +15757,38 @@
         </p:blipFill>
         <p:spPr>
           <a:xfrm>
-            <a:off x="0" y="1676741"/>
-            <a:ext cx="12192000" cy="4386841"/>
+            <a:off x="269913" y="1551404"/>
+            <a:ext cx="11497937" cy="2594528"/>
+          </a:xfrm>
+          <a:prstGeom prst="rect">
+            <a:avLst/>
+          </a:prstGeom>
+        </p:spPr>
+      </p:pic>
+      <p:pic>
+        <p:nvPicPr>
+          <p:cNvPr id="10" name="Picture 9">
+            <a:extLst>
+              <a:ext uri="{FF2B5EF4-FFF2-40B4-BE49-F238E27FC236}">
+                <a16:creationId xmlns:a16="http://schemas.microsoft.com/office/drawing/2014/main" id="{C65D8A92-398D-3334-36A1-157C8659F5A6}"/>
+              </a:ext>
+            </a:extLst>
+          </p:cNvPr>
+          <p:cNvPicPr>
+            <a:picLocks noChangeAspect="1"/>
+          </p:cNvPicPr>
+          <p:nvPr/>
+        </p:nvPicPr>
+        <p:blipFill>
+          <a:blip r:embed="rId4"/>
+          <a:stretch>
+            <a:fillRect/>
+          </a:stretch>
+        </p:blipFill>
+        <p:spPr>
+          <a:xfrm>
+            <a:off x="269912" y="1595726"/>
+            <a:ext cx="11497937" cy="3666476"/>
           </a:xfrm>
           <a:prstGeom prst="rect">
             <a:avLst/>
@@ -15776,6 +15806,129 @@
     <a:masterClrMapping/>
   </p:clrMapOvr>
   <p:transition spd="med"/>
+  <p:timing>
+    <p:tnLst>
+      <p:par>
+        <p:cTn id="1" dur="indefinite" restart="never" nodeType="tmRoot">
+          <p:childTnLst>
+            <p:seq concurrent="1" nextAc="seek">
+              <p:cTn id="2" dur="indefinite" nodeType="mainSeq">
+                <p:childTnLst>
+                  <p:par>
+                    <p:cTn id="3" fill="hold">
+                      <p:stCondLst>
+                        <p:cond delay="indefinite"/>
+                        <p:cond evt="onBegin" delay="0">
+                          <p:tn val="2"/>
+                        </p:cond>
+                      </p:stCondLst>
+                      <p:childTnLst>
+                        <p:par>
+                          <p:cTn id="4" fill="hold">
+                            <p:stCondLst>
+                              <p:cond delay="0"/>
+                            </p:stCondLst>
+                            <p:childTnLst>
+                              <p:par>
+                                <p:cTn id="5" presetID="1" presetClass="entr" presetSubtype="0" fill="hold" nodeType="withEffect">
+                                  <p:stCondLst>
+                                    <p:cond delay="0"/>
+                                  </p:stCondLst>
+                                  <p:childTnLst>
+                                    <p:set>
+                                      <p:cBhvr>
+                                        <p:cTn id="6" dur="1" fill="hold">
+                                          <p:stCondLst>
+                                            <p:cond delay="0"/>
+                                          </p:stCondLst>
+                                        </p:cTn>
+                                        <p:tgtEl>
+                                          <p:spTgt spid="8"/>
+                                        </p:tgtEl>
+                                        <p:attrNameLst>
+                                          <p:attrName>style.visibility</p:attrName>
+                                        </p:attrNameLst>
+                                      </p:cBhvr>
+                                      <p:to>
+                                        <p:strVal val="visible"/>
+                                      </p:to>
+                                    </p:set>
+                                  </p:childTnLst>
+                                </p:cTn>
+                              </p:par>
+                            </p:childTnLst>
+                          </p:cTn>
+                        </p:par>
+                      </p:childTnLst>
+                    </p:cTn>
+                  </p:par>
+                  <p:par>
+                    <p:cTn id="7" fill="hold">
+                      <p:stCondLst>
+                        <p:cond delay="indefinite"/>
+                      </p:stCondLst>
+                      <p:childTnLst>
+                        <p:par>
+                          <p:cTn id="8" fill="hold">
+                            <p:stCondLst>
+                              <p:cond delay="0"/>
+                            </p:stCondLst>
+                            <p:childTnLst>
+                              <p:par>
+                                <p:cTn id="9" presetID="1" presetClass="entr" presetSubtype="0" fill="hold" nodeType="clickEffect">
+                                  <p:stCondLst>
+                                    <p:cond delay="0"/>
+                                  </p:stCondLst>
+                                  <p:childTnLst>
+                                    <p:set>
+                                      <p:cBhvr>
+                                        <p:cTn id="10" dur="1" fill="hold">
+                                          <p:stCondLst>
+                                            <p:cond delay="0"/>
+                                          </p:stCondLst>
+                                        </p:cTn>
+                                        <p:tgtEl>
+                                          <p:spTgt spid="10"/>
+                                        </p:tgtEl>
+                                        <p:attrNameLst>
+                                          <p:attrName>style.visibility</p:attrName>
+                                        </p:attrNameLst>
+                                      </p:cBhvr>
+                                      <p:to>
+                                        <p:strVal val="visible"/>
+                                      </p:to>
+                                    </p:set>
+                                  </p:childTnLst>
+                                </p:cTn>
+                              </p:par>
+                            </p:childTnLst>
+                          </p:cTn>
+                        </p:par>
+                      </p:childTnLst>
+                    </p:cTn>
+                  </p:par>
+                </p:childTnLst>
+              </p:cTn>
+              <p:prevCondLst>
+                <p:cond evt="onPrev" delay="0">
+                  <p:tgtEl>
+                    <p:sldTgt/>
+                  </p:tgtEl>
+                </p:cond>
+              </p:prevCondLst>
+              <p:nextCondLst>
+                <p:cond evt="onNext" delay="0">
+                  <p:tgtEl>
+                    <p:sldTgt/>
+                  </p:tgtEl>
+                </p:cond>
+              </p:nextCondLst>
+            </p:seq>
+          </p:childTnLst>
+        </p:cTn>
+      </p:par>
+    </p:tnLst>
+  </p:timing>
 </p:sld>
 </file>
 
@@ -17425,10 +17578,10 @@
       </p:sp>
       <p:pic>
         <p:nvPicPr>
-          <p:cNvPr id="5" name="Picture 4">
+          <p:cNvPr id="12" name="Picture 11">
             <a:extLst>
               <a:ext uri="{FF2B5EF4-FFF2-40B4-BE49-F238E27FC236}">
-                <a16:creationId xmlns:a16="http://schemas.microsoft.com/office/drawing/2014/main" id="{8EA3F860-29F9-9A7C-A793-7F2ECE6FF4FB}"/>
+                <a16:creationId xmlns:a16="http://schemas.microsoft.com/office/drawing/2014/main" id="{E4A5DC3F-DA64-F3F4-C259-D31E218E9593}"/>
               </a:ext>
             </a:extLst>
           </p:cNvPr>
@@ -17445,8 +17598,38 @@
         </p:blipFill>
         <p:spPr>
           <a:xfrm>
-            <a:off x="123092" y="696965"/>
-            <a:ext cx="12192000" cy="5464069"/>
+            <a:off x="496288" y="1640022"/>
+            <a:ext cx="11437088" cy="2618322"/>
+          </a:xfrm>
+          <a:prstGeom prst="rect">
+            <a:avLst/>
+          </a:prstGeom>
+        </p:spPr>
+      </p:pic>
+      <p:pic>
+        <p:nvPicPr>
+          <p:cNvPr id="14" name="Picture 13">
+            <a:extLst>
+              <a:ext uri="{FF2B5EF4-FFF2-40B4-BE49-F238E27FC236}">
+                <a16:creationId xmlns:a16="http://schemas.microsoft.com/office/drawing/2014/main" id="{F547D154-4707-10B5-D8F5-17477BA742A7}"/>
+              </a:ext>
+            </a:extLst>
+          </p:cNvPr>
+          <p:cNvPicPr>
+            <a:picLocks noChangeAspect="1"/>
+          </p:cNvPicPr>
+          <p:nvPr/>
+        </p:nvPicPr>
+        <p:blipFill>
+          <a:blip r:embed="rId4"/>
+          <a:stretch>
+            <a:fillRect/>
+          </a:stretch>
+        </p:blipFill>
+        <p:spPr>
+          <a:xfrm>
+            <a:off x="377456" y="1640022"/>
+            <a:ext cx="11555920" cy="4429098"/>
           </a:xfrm>
           <a:prstGeom prst="rect">
             <a:avLst/>
@@ -17464,6 +17647,129 @@
     <a:masterClrMapping/>
   </p:clrMapOvr>
   <p:transition spd="med"/>
+  <p:timing>
+    <p:tnLst>
+      <p:par>
+        <p:cTn id="1" dur="indefinite" restart="never" nodeType="tmRoot">
+          <p:childTnLst>
+            <p:seq concurrent="1" nextAc="seek">
+              <p:cTn id="2" dur="indefinite" nodeType="mainSeq">
+                <p:childTnLst>
+                  <p:par>
+                    <p:cTn id="3" fill="hold">
+                      <p:stCondLst>
+                        <p:cond delay="indefinite"/>
+                        <p:cond evt="onBegin" delay="0">
+                          <p:tn val="2"/>
+                        </p:cond>
+                      </p:stCondLst>
+                      <p:childTnLst>
+                        <p:par>
+                          <p:cTn id="4" fill="hold">
+                            <p:stCondLst>
+                              <p:cond delay="0"/>
+                            </p:stCondLst>
+                            <p:childTnLst>
+                              <p:par>
+                                <p:cTn id="5" presetID="1" presetClass="entr" presetSubtype="0" fill="hold" nodeType="withEffect">
+                                  <p:stCondLst>
+                                    <p:cond delay="0"/>
+                                  </p:stCondLst>
+                                  <p:childTnLst>
+                                    <p:set>
+                                      <p:cBhvr>
+                                        <p:cTn id="6" dur="1" fill="hold">
+                                          <p:stCondLst>
+                                            <p:cond delay="0"/>
+                                          </p:stCondLst>
+                                        </p:cTn>
+                                        <p:tgtEl>
+                                          <p:spTgt spid="12"/>
+                                        </p:tgtEl>
+                                        <p:attrNameLst>
+                                          <p:attrName>style.visibility</p:attrName>
+                                        </p:attrNameLst>
+                                      </p:cBhvr>
+                                      <p:to>
+                                        <p:strVal val="visible"/>
+                                      </p:to>
+                                    </p:set>
+                                  </p:childTnLst>
+                                </p:cTn>
+                              </p:par>
+                            </p:childTnLst>
+                          </p:cTn>
+                        </p:par>
+                      </p:childTnLst>
+                    </p:cTn>
+                  </p:par>
+                  <p:par>
+                    <p:cTn id="7" fill="hold">
+                      <p:stCondLst>
+                        <p:cond delay="indefinite"/>
+                      </p:stCondLst>
+                      <p:childTnLst>
+                        <p:par>
+                          <p:cTn id="8" fill="hold">
+                            <p:stCondLst>
+                              <p:cond delay="0"/>
+                            </p:stCondLst>
+                            <p:childTnLst>
+                              <p:par>
+                                <p:cTn id="9" presetID="1" presetClass="entr" presetSubtype="0" fill="hold" nodeType="clickEffect">
+                                  <p:stCondLst>
+                                    <p:cond delay="0"/>
+                                  </p:stCondLst>
+                                  <p:childTnLst>
+                                    <p:set>
+                                      <p:cBhvr>
+                                        <p:cTn id="10" dur="1" fill="hold">
+                                          <p:stCondLst>
+                                            <p:cond delay="0"/>
+                                          </p:stCondLst>
+                                        </p:cTn>
+                                        <p:tgtEl>
+                                          <p:spTgt spid="14"/>
+                                        </p:tgtEl>
+                                        <p:attrNameLst>
+                                          <p:attrName>style.visibility</p:attrName>
+                                        </p:attrNameLst>
+                                      </p:cBhvr>
+                                      <p:to>
+                                        <p:strVal val="visible"/>
+                                      </p:to>
+                                    </p:set>
+                                  </p:childTnLst>
+                                </p:cTn>
+                              </p:par>
+                            </p:childTnLst>
+                          </p:cTn>
+                        </p:par>
+                      </p:childTnLst>
+                    </p:cTn>
+                  </p:par>
+                </p:childTnLst>
+              </p:cTn>
+              <p:prevCondLst>
+                <p:cond evt="onPrev" delay="0">
+                  <p:tgtEl>
+                    <p:sldTgt/>
+                  </p:tgtEl>
+                </p:cond>
+              </p:prevCondLst>
+              <p:nextCondLst>
+                <p:cond evt="onNext" delay="0">
+                  <p:tgtEl>
+                    <p:sldTgt/>
+                  </p:tgtEl>
+                </p:cond>
+              </p:nextCondLst>
+            </p:seq>
+          </p:childTnLst>
+        </p:cTn>
+      </p:par>
+    </p:tnLst>
+  </p:timing>
 </p:sld>
 </file>
 
@@ -27575,7 +27881,7 @@
           </a:prstGeom>
           <a:extLst>
             <a:ext uri="{C572A759-6A51-4108-AA02-DFA0A04FC94B}">
-              <ma14:wrappingTextBoxFlag xmlns:ma14="http://schemas.microsoft.com/office/mac/drawingml/2011/main" xmlns:a14="http://schemas.microsoft.com/office/drawing/2010/main" xmlns:m="http://schemas.openxmlformats.org/officeDocument/2006/math" xmlns="" val="1"/>
+              <ma14:wrappingTextBoxFlag xmlns="" xmlns:m="http://schemas.openxmlformats.org/officeDocument/2006/math" xmlns:a14="http://schemas.microsoft.com/office/drawing/2010/main" xmlns:ma14="http://schemas.microsoft.com/office/mac/drawingml/2011/main" val="1"/>
             </a:ext>
           </a:extLst>
         </p:spPr>
@@ -27616,7 +27922,7 @@
           </a:ln>
           <a:extLst>
             <a:ext uri="{C572A759-6A51-4108-AA02-DFA0A04FC94B}">
-              <ma14:wrappingTextBoxFlag xmlns:ma14="http://schemas.microsoft.com/office/mac/drawingml/2011/main" xmlns:a14="http://schemas.microsoft.com/office/drawing/2010/main" xmlns:m="http://schemas.openxmlformats.org/officeDocument/2006/math" xmlns="" val="1"/>
+              <ma14:wrappingTextBoxFlag xmlns="" xmlns:m="http://schemas.openxmlformats.org/officeDocument/2006/math" xmlns:a14="http://schemas.microsoft.com/office/drawing/2010/main" xmlns:ma14="http://schemas.microsoft.com/office/mac/drawingml/2011/main" val="1"/>
             </a:ext>
           </a:extLst>
         </p:spPr>
@@ -27891,7 +28197,7 @@
             <a:effectLst/>
             <a:extLst>
               <a:ext uri="{C572A759-6A51-4108-AA02-DFA0A04FC94B}">
-                <ma14:wrappingTextBoxFlag xmlns:ma14="http://schemas.microsoft.com/office/mac/drawingml/2011/main" xmlns:a14="http://schemas.microsoft.com/office/drawing/2010/main" xmlns:m="http://schemas.openxmlformats.org/officeDocument/2006/math" xmlns="" val="1"/>
+                <ma14:wrappingTextBoxFlag xmlns="" xmlns:m="http://schemas.openxmlformats.org/officeDocument/2006/math" xmlns:a14="http://schemas.microsoft.com/office/drawing/2010/main" xmlns:ma14="http://schemas.microsoft.com/office/mac/drawingml/2011/main" val="1"/>
               </a:ext>
             </a:extLst>
           </p:spPr>
@@ -28235,7 +28541,7 @@
           </a:prstGeom>
           <a:extLst>
             <a:ext uri="{C572A759-6A51-4108-AA02-DFA0A04FC94B}">
-              <ma14:wrappingTextBoxFlag xmlns:ma14="http://schemas.microsoft.com/office/mac/drawingml/2011/main" xmlns:a14="http://schemas.microsoft.com/office/drawing/2010/main" xmlns:m="http://schemas.openxmlformats.org/officeDocument/2006/math" xmlns="" val="1"/>
+              <ma14:wrappingTextBoxFlag xmlns="" xmlns:m="http://schemas.openxmlformats.org/officeDocument/2006/math" xmlns:a14="http://schemas.microsoft.com/office/drawing/2010/main" xmlns:ma14="http://schemas.microsoft.com/office/mac/drawingml/2011/main" val="1"/>
             </a:ext>
           </a:extLst>
         </p:spPr>
@@ -28506,7 +28812,7 @@
           </a:prstGeom>
           <a:extLst>
             <a:ext uri="{C572A759-6A51-4108-AA02-DFA0A04FC94B}">
-              <ma14:wrappingTextBoxFlag xmlns="" xmlns:m="http://schemas.openxmlformats.org/officeDocument/2006/math" xmlns:a14="http://schemas.microsoft.com/office/drawing/2010/main" xmlns:ma14="http://schemas.microsoft.com/office/mac/drawingml/2011/main" val="1"/>
+              <ma14:wrappingTextBoxFlag xmlns:ma14="http://schemas.microsoft.com/office/mac/drawingml/2011/main" xmlns:a14="http://schemas.microsoft.com/office/drawing/2010/main" xmlns:m="http://schemas.openxmlformats.org/officeDocument/2006/math" xmlns="" val="1"/>
             </a:ext>
           </a:extLst>
         </p:spPr>
@@ -28550,7 +28856,7 @@
           </a:ln>
           <a:extLst>
             <a:ext uri="{C572A759-6A51-4108-AA02-DFA0A04FC94B}">
-              <ma14:wrappingTextBoxFlag xmlns="" xmlns:m="http://schemas.openxmlformats.org/officeDocument/2006/math" xmlns:a14="http://schemas.microsoft.com/office/drawing/2010/main" xmlns:ma14="http://schemas.microsoft.com/office/mac/drawingml/2011/main" val="1"/>
+              <ma14:wrappingTextBoxFlag xmlns:ma14="http://schemas.microsoft.com/office/mac/drawingml/2011/main" xmlns:a14="http://schemas.microsoft.com/office/drawing/2010/main" xmlns:m="http://schemas.openxmlformats.org/officeDocument/2006/math" xmlns="" val="1"/>
             </a:ext>
           </a:extLst>
         </p:spPr>

</xml_diff>